<commit_message>
docs: UI Sketch v2
</commit_message>
<xml_diff>
--- a/docs/resources/ui-sketch.pptx
+++ b/docs/resources/ui-sketch.pptx
@@ -6,6 +6,7 @@
   </p:sldMasterIdLst>
   <p:sldIdLst>
     <p:sldId id="256" r:id="rId2"/>
+    <p:sldId id="257" r:id="rId3"/>
   </p:sldIdLst>
   <p:sldSz cx="12192000" cy="6858000"/>
   <p:notesSz cx="6858000" cy="9144000"/>
@@ -104,6 +105,11 @@
       </a:defRPr>
     </a:lvl9pPr>
   </p:defaultTextStyle>
+  <p:extLst>
+    <p:ext uri="{EFAFB233-063F-42B5-8137-9DF3F51BA10A}">
+      <p15:sldGuideLst xmlns:p15="http://schemas.microsoft.com/office/powerpoint/2012/main"/>
+    </p:ext>
+  </p:extLst>
 </p:presentation>
 </file>
 
@@ -256,7 +262,7 @@
           <a:p>
             <a:fld id="{732CA068-D5BF-ED43-8753-1CCA6E996283}" type="datetimeFigureOut">
               <a:rPr lang="en-HU" smtClean="0"/>
-              <a:t>2022. 02. 07.</a:t>
+              <a:t>02/09/2022</a:t>
             </a:fld>
             <a:endParaRPr lang="en-HU"/>
           </a:p>
@@ -456,7 +462,7 @@
           <a:p>
             <a:fld id="{732CA068-D5BF-ED43-8753-1CCA6E996283}" type="datetimeFigureOut">
               <a:rPr lang="en-HU" smtClean="0"/>
-              <a:t>2022. 02. 07.</a:t>
+              <a:t>02/09/2022</a:t>
             </a:fld>
             <a:endParaRPr lang="en-HU"/>
           </a:p>
@@ -666,7 +672,7 @@
           <a:p>
             <a:fld id="{732CA068-D5BF-ED43-8753-1CCA6E996283}" type="datetimeFigureOut">
               <a:rPr lang="en-HU" smtClean="0"/>
-              <a:t>2022. 02. 07.</a:t>
+              <a:t>02/09/2022</a:t>
             </a:fld>
             <a:endParaRPr lang="en-HU"/>
           </a:p>
@@ -866,7 +872,7 @@
           <a:p>
             <a:fld id="{732CA068-D5BF-ED43-8753-1CCA6E996283}" type="datetimeFigureOut">
               <a:rPr lang="en-HU" smtClean="0"/>
-              <a:t>2022. 02. 07.</a:t>
+              <a:t>02/09/2022</a:t>
             </a:fld>
             <a:endParaRPr lang="en-HU"/>
           </a:p>
@@ -1142,7 +1148,7 @@
           <a:p>
             <a:fld id="{732CA068-D5BF-ED43-8753-1CCA6E996283}" type="datetimeFigureOut">
               <a:rPr lang="en-HU" smtClean="0"/>
-              <a:t>2022. 02. 07.</a:t>
+              <a:t>02/09/2022</a:t>
             </a:fld>
             <a:endParaRPr lang="en-HU"/>
           </a:p>
@@ -1410,7 +1416,7 @@
           <a:p>
             <a:fld id="{732CA068-D5BF-ED43-8753-1CCA6E996283}" type="datetimeFigureOut">
               <a:rPr lang="en-HU" smtClean="0"/>
-              <a:t>2022. 02. 07.</a:t>
+              <a:t>02/09/2022</a:t>
             </a:fld>
             <a:endParaRPr lang="en-HU"/>
           </a:p>
@@ -1825,7 +1831,7 @@
           <a:p>
             <a:fld id="{732CA068-D5BF-ED43-8753-1CCA6E996283}" type="datetimeFigureOut">
               <a:rPr lang="en-HU" smtClean="0"/>
-              <a:t>2022. 02. 07.</a:t>
+              <a:t>02/09/2022</a:t>
             </a:fld>
             <a:endParaRPr lang="en-HU"/>
           </a:p>
@@ -1967,7 +1973,7 @@
           <a:p>
             <a:fld id="{732CA068-D5BF-ED43-8753-1CCA6E996283}" type="datetimeFigureOut">
               <a:rPr lang="en-HU" smtClean="0"/>
-              <a:t>2022. 02. 07.</a:t>
+              <a:t>02/09/2022</a:t>
             </a:fld>
             <a:endParaRPr lang="en-HU"/>
           </a:p>
@@ -2080,7 +2086,7 @@
           <a:p>
             <a:fld id="{732CA068-D5BF-ED43-8753-1CCA6E996283}" type="datetimeFigureOut">
               <a:rPr lang="en-HU" smtClean="0"/>
-              <a:t>2022. 02. 07.</a:t>
+              <a:t>02/09/2022</a:t>
             </a:fld>
             <a:endParaRPr lang="en-HU"/>
           </a:p>
@@ -2393,7 +2399,7 @@
           <a:p>
             <a:fld id="{732CA068-D5BF-ED43-8753-1CCA6E996283}" type="datetimeFigureOut">
               <a:rPr lang="en-HU" smtClean="0"/>
-              <a:t>2022. 02. 07.</a:t>
+              <a:t>02/09/2022</a:t>
             </a:fld>
             <a:endParaRPr lang="en-HU"/>
           </a:p>
@@ -2682,7 +2688,7 @@
           <a:p>
             <a:fld id="{732CA068-D5BF-ED43-8753-1CCA6E996283}" type="datetimeFigureOut">
               <a:rPr lang="en-HU" smtClean="0"/>
-              <a:t>2022. 02. 07.</a:t>
+              <a:t>02/09/2022</a:t>
             </a:fld>
             <a:endParaRPr lang="en-HU"/>
           </a:p>
@@ -2925,7 +2931,7 @@
           <a:p>
             <a:fld id="{732CA068-D5BF-ED43-8753-1CCA6E996283}" type="datetimeFigureOut">
               <a:rPr lang="en-HU" smtClean="0"/>
-              <a:t>2022. 02. 07.</a:t>
+              <a:t>02/09/2022</a:t>
             </a:fld>
             <a:endParaRPr lang="en-HU"/>
           </a:p>
@@ -3356,8 +3362,8 @@
         </p:nvSpPr>
         <p:spPr>
           <a:xfrm>
-            <a:off x="457200" y="469900"/>
-            <a:ext cx="11049000" cy="165100"/>
+            <a:off x="457199" y="469900"/>
+            <a:ext cx="11526323" cy="145997"/>
           </a:xfrm>
           <a:prstGeom prst="rect">
             <a:avLst/>
@@ -3390,10 +3396,10 @@
       </p:sp>
       <p:sp>
         <p:nvSpPr>
-          <p:cNvPr id="5" name="Rectangle 4">
-            <a:extLst>
-              <a:ext uri="{FF2B5EF4-FFF2-40B4-BE49-F238E27FC236}">
-                <a16:creationId xmlns:a16="http://schemas.microsoft.com/office/drawing/2014/main" id="{C468389F-55E1-0B4E-8C51-CF8EC397EE66}"/>
+          <p:cNvPr id="48" name="Rectangle 47">
+            <a:extLst>
+              <a:ext uri="{FF2B5EF4-FFF2-40B4-BE49-F238E27FC236}">
+                <a16:creationId xmlns:a16="http://schemas.microsoft.com/office/drawing/2014/main" id="{1D092BA2-200D-4429-B4D9-C4EA1069DF15}"/>
               </a:ext>
             </a:extLst>
           </p:cNvPr>
@@ -3402,12 +3408,18 @@
         </p:nvSpPr>
         <p:spPr>
           <a:xfrm>
-            <a:off x="11658600" y="127000"/>
-            <a:ext cx="292100" cy="825500"/>
+            <a:off x="2204609" y="456742"/>
+            <a:ext cx="4848607" cy="165506"/>
           </a:xfrm>
           <a:prstGeom prst="rect">
             <a:avLst/>
           </a:prstGeom>
+          <a:solidFill>
+            <a:srgbClr val="7030A0"/>
+          </a:solidFill>
+          <a:ln>
+            <a:noFill/>
+          </a:ln>
         </p:spPr>
         <p:style>
           <a:lnRef idx="2">
@@ -3806,8 +3818,8 @@
         </p:nvSpPr>
         <p:spPr>
           <a:xfrm>
-            <a:off x="4927600" y="952500"/>
-            <a:ext cx="6578600" cy="5129429"/>
+            <a:off x="2522468" y="1294029"/>
+            <a:ext cx="6365072" cy="4206684"/>
           </a:xfrm>
           <a:prstGeom prst="rect">
             <a:avLst/>
@@ -3997,8 +4009,8 @@
         </p:nvSpPr>
         <p:spPr>
           <a:xfrm>
-            <a:off x="2204821" y="963829"/>
-            <a:ext cx="2520951" cy="4078071"/>
+            <a:off x="9134857" y="2203620"/>
+            <a:ext cx="2857861" cy="3834726"/>
           </a:xfrm>
           <a:prstGeom prst="roundRect">
             <a:avLst>
@@ -4056,8 +4068,8 @@
         </p:nvSpPr>
         <p:spPr>
           <a:xfrm>
-            <a:off x="5079999" y="6247714"/>
-            <a:ext cx="4953001" cy="430429"/>
+            <a:off x="9134857" y="6113004"/>
+            <a:ext cx="2857861" cy="430429"/>
           </a:xfrm>
           <a:prstGeom prst="roundRect">
             <a:avLst>
@@ -4106,8 +4118,8 @@
         </p:nvSpPr>
         <p:spPr>
           <a:xfrm>
-            <a:off x="10198100" y="6292506"/>
-            <a:ext cx="340843" cy="340843"/>
+            <a:off x="7292416" y="6113004"/>
+            <a:ext cx="340843" cy="383604"/>
           </a:xfrm>
           <a:prstGeom prst="ellipse">
             <a:avLst/>
@@ -4152,8 +4164,8 @@
         </p:nvSpPr>
         <p:spPr>
           <a:xfrm>
-            <a:off x="10727386" y="6292505"/>
-            <a:ext cx="340843" cy="342000"/>
+            <a:off x="7821702" y="6112857"/>
+            <a:ext cx="340843" cy="384906"/>
           </a:xfrm>
           <a:prstGeom prst="ellipse">
             <a:avLst/>
@@ -4615,8 +4627,8 @@
         </p:nvSpPr>
         <p:spPr>
           <a:xfrm>
-            <a:off x="11256672" y="6292505"/>
-            <a:ext cx="340843" cy="342000"/>
+            <a:off x="8350988" y="6112857"/>
+            <a:ext cx="340843" cy="384906"/>
           </a:xfrm>
           <a:prstGeom prst="ellipse">
             <a:avLst/>
@@ -4661,8 +4673,8 @@
         </p:nvSpPr>
         <p:spPr>
           <a:xfrm>
-            <a:off x="2185771" y="5251623"/>
-            <a:ext cx="2520951" cy="1494487"/>
+            <a:off x="9134857" y="884728"/>
+            <a:ext cx="2801696" cy="1186261"/>
           </a:xfrm>
           <a:prstGeom prst="roundRect">
             <a:avLst>
@@ -4690,6 +4702,21 @@
           <a:bodyPr rtlCol="0" anchor="ctr"/>
           <a:lstStyle/>
           <a:p>
+            <a:r>
+              <a:rPr lang="en-GB" dirty="0"/>
+              <a:t>W</a:t>
+            </a:r>
+            <a:r>
+              <a:rPr lang="en-HU" dirty="0"/>
+              <a:t>aiting for 17 people…</a:t>
+            </a:r>
+            <a:endParaRPr lang="en-US" b="1" dirty="0">
+              <a:solidFill>
+                <a:srgbClr val="FFC000"/>
+              </a:solidFill>
+            </a:endParaRPr>
+          </a:p>
+          <a:p>
             <a:pPr algn="ctr"/>
             <a:r>
               <a:rPr lang="en-HU" b="1" dirty="0">
@@ -4730,7 +4757,7 @@
         </p:nvSpPr>
         <p:spPr>
           <a:xfrm>
-            <a:off x="470280" y="445352"/>
+            <a:off x="434417" y="450391"/>
             <a:ext cx="1794432" cy="185014"/>
           </a:xfrm>
           <a:prstGeom prst="rect">
@@ -4782,7 +4809,7 @@
         </p:nvSpPr>
         <p:spPr>
           <a:xfrm>
-            <a:off x="7292416" y="1872745"/>
+            <a:off x="6068795" y="1926868"/>
             <a:ext cx="2042084" cy="2042084"/>
           </a:xfrm>
           <a:prstGeom prst="cloud">
@@ -4828,7 +4855,7 @@
         </p:nvSpPr>
         <p:spPr>
           <a:xfrm>
-            <a:off x="5867400" y="1872745"/>
+            <a:off x="5010703" y="1951092"/>
             <a:ext cx="1130119" cy="1130119"/>
           </a:xfrm>
           <a:prstGeom prst="sun">
@@ -4874,7 +4901,7 @@
         </p:nvSpPr>
         <p:spPr>
           <a:xfrm>
-            <a:off x="10113352" y="6603662"/>
+            <a:off x="7207668" y="6466920"/>
             <a:ext cx="520463" cy="276999"/>
           </a:xfrm>
           <a:prstGeom prst="rect">
@@ -4909,7 +4936,7 @@
         </p:nvSpPr>
         <p:spPr>
           <a:xfrm>
-            <a:off x="10548256" y="6591567"/>
+            <a:off x="7642572" y="6454825"/>
             <a:ext cx="699102" cy="276999"/>
           </a:xfrm>
           <a:prstGeom prst="rect">
@@ -4944,7 +4971,7 @@
         </p:nvSpPr>
         <p:spPr>
           <a:xfrm>
-            <a:off x="11227759" y="6581001"/>
+            <a:off x="8322075" y="6444259"/>
             <a:ext cx="466794" cy="276999"/>
           </a:xfrm>
           <a:prstGeom prst="rect">
@@ -4961,45 +4988,6 @@
             <a:r>
               <a:rPr lang="en-HU" sz="1200" dirty="0"/>
               <a:t>Lock</a:t>
-            </a:r>
-          </a:p>
-        </p:txBody>
-      </p:sp>
-      <p:sp>
-        <p:nvSpPr>
-          <p:cNvPr id="40" name="TextBox 39">
-            <a:extLst>
-              <a:ext uri="{FF2B5EF4-FFF2-40B4-BE49-F238E27FC236}">
-                <a16:creationId xmlns:a16="http://schemas.microsoft.com/office/drawing/2014/main" id="{F77CD25E-3A48-1043-982A-7F69BFAEA559}"/>
-              </a:ext>
-            </a:extLst>
-          </p:cNvPr>
-          <p:cNvSpPr txBox="1"/>
-          <p:nvPr/>
-        </p:nvSpPr>
-        <p:spPr>
-          <a:xfrm>
-            <a:off x="2362441" y="5186063"/>
-            <a:ext cx="2388731" cy="369332"/>
-          </a:xfrm>
-          <a:prstGeom prst="rect">
-            <a:avLst/>
-          </a:prstGeom>
-          <a:noFill/>
-        </p:spPr>
-        <p:txBody>
-          <a:bodyPr wrap="none" rtlCol="0">
-            <a:spAutoFit/>
-          </a:bodyPr>
-          <a:lstStyle/>
-          <a:p>
-            <a:r>
-              <a:rPr lang="en-GB" dirty="0"/>
-              <a:t>W</a:t>
-            </a:r>
-            <a:r>
-              <a:rPr lang="en-HU" dirty="0"/>
-              <a:t>aiting for 17 people…</a:t>
             </a:r>
           </a:p>
         </p:txBody>
@@ -5317,10 +5305,86 @@
           </a:p>
         </p:txBody>
       </p:sp>
+      <p:sp>
+        <p:nvSpPr>
+          <p:cNvPr id="2" name="Rectangle 1">
+            <a:extLst>
+              <a:ext uri="{FF2B5EF4-FFF2-40B4-BE49-F238E27FC236}">
+                <a16:creationId xmlns:a16="http://schemas.microsoft.com/office/drawing/2014/main" id="{763A34C5-0FFF-45DE-8B94-9680AB43A087}"/>
+              </a:ext>
+            </a:extLst>
+          </p:cNvPr>
+          <p:cNvSpPr/>
+          <p:nvPr/>
+        </p:nvSpPr>
+        <p:spPr>
+          <a:xfrm>
+            <a:off x="11840820" y="238903"/>
+            <a:ext cx="185167" cy="590210"/>
+          </a:xfrm>
+          <a:prstGeom prst="rect">
+            <a:avLst/>
+          </a:prstGeom>
+        </p:spPr>
+        <p:style>
+          <a:lnRef idx="2">
+            <a:schemeClr val="accent1">
+              <a:shade val="50000"/>
+            </a:schemeClr>
+          </a:lnRef>
+          <a:fillRef idx="1">
+            <a:schemeClr val="accent1"/>
+          </a:fillRef>
+          <a:effectRef idx="0">
+            <a:schemeClr val="accent1"/>
+          </a:effectRef>
+          <a:fontRef idx="minor">
+            <a:schemeClr val="lt1"/>
+          </a:fontRef>
+        </p:style>
+        <p:txBody>
+          <a:bodyPr rtlCol="0" anchor="ctr"/>
+          <a:lstStyle/>
+          <a:p>
+            <a:pPr algn="ctr"/>
+            <a:endParaRPr lang="en-US"/>
+          </a:p>
+        </p:txBody>
+      </p:sp>
     </p:spTree>
     <p:extLst>
       <p:ext uri="{BB962C8B-B14F-4D97-AF65-F5344CB8AC3E}">
         <p14:creationId xmlns:p14="http://schemas.microsoft.com/office/powerpoint/2010/main" val="4018599020"/>
+      </p:ext>
+    </p:extLst>
+  </p:cSld>
+  <p:clrMapOvr>
+    <a:masterClrMapping/>
+  </p:clrMapOvr>
+</p:sld>
+</file>
+
+<file path=ppt/slides/slide2.xml><?xml version="1.0" encoding="utf-8"?>
+<p:sld xmlns:a="http://schemas.openxmlformats.org/drawingml/2006/main" xmlns:r="http://schemas.openxmlformats.org/officeDocument/2006/relationships" xmlns:p="http://schemas.openxmlformats.org/presentationml/2006/main">
+  <p:cSld>
+    <p:spTree>
+      <p:nvGrpSpPr>
+        <p:cNvPr id="1" name=""/>
+        <p:cNvGrpSpPr/>
+        <p:nvPr/>
+      </p:nvGrpSpPr>
+      <p:grpSpPr>
+        <a:xfrm>
+          <a:off x="0" y="0"/>
+          <a:ext cx="0" cy="0"/>
+          <a:chOff x="0" y="0"/>
+          <a:chExt cx="0" cy="0"/>
+        </a:xfrm>
+      </p:grpSpPr>
+    </p:spTree>
+    <p:extLst>
+      <p:ext uri="{BB962C8B-B14F-4D97-AF65-F5344CB8AC3E}">
+        <p14:creationId xmlns:p14="http://schemas.microsoft.com/office/powerpoint/2010/main" val="855001702"/>
       </p:ext>
     </p:extLst>
   </p:cSld>

</xml_diff>